<commit_message>
Updates 04 to add steps to remove test files
</commit_message>
<xml_diff>
--- a/04-refactoring_cookbooks_with_tests.pptx
+++ b/04-refactoring_cookbooks_with_tests.pptx
@@ -326,7 +326,7 @@
               <a:pPr>
                 <a:defRPr/>
               </a:pPr>
-              <a:t>8/29/16</a:t>
+              <a:t>10/11/16</a:t>
             </a:fld>
             <a:endParaRPr lang="en-US" dirty="0"/>
           </a:p>
@@ -509,7 +509,7 @@
               <a:pPr>
                 <a:defRPr/>
               </a:pPr>
-              <a:t>8/29/16</a:t>
+              <a:t>10/11/16</a:t>
             </a:fld>
             <a:endParaRPr lang="en-US" dirty="0"/>
           </a:p>
@@ -16794,25 +16794,6 @@
       </p:sp>
       <p:sp>
         <p:nvSpPr>
-          <p:cNvPr id="4" name="Content Placeholder 3"/>
-          <p:cNvSpPr>
-            <a:spLocks noGrp="1"/>
-          </p:cNvSpPr>
-          <p:nvPr>
-            <p:ph sz="quarter" idx="12"/>
-          </p:nvPr>
-        </p:nvSpPr>
-        <p:spPr/>
-        <p:txBody>
-          <a:bodyPr/>
-          <a:lstStyle/>
-          <a:p>
-            <a:endParaRPr lang="en-US"/>
-          </a:p>
-        </p:txBody>
-      </p:sp>
-      <p:sp>
-        <p:nvSpPr>
           <p:cNvPr id="5" name="Title 4"/>
           <p:cNvSpPr>
             <a:spLocks noGrp="1"/>
@@ -16847,6 +16828,13 @@
   <p:transition xmlns:p14="http://schemas.microsoft.com/office/powerpoint/2010/main" spd="med">
     <p:fade/>
   </p:transition>
+  <p:timing>
+    <p:tnLst>
+      <p:par>
+        <p:cTn xmlns:p14="http://schemas.microsoft.com/office/powerpoint/2010/main" id="1" dur="indefinite" restart="never" nodeType="tmRoot"/>
+      </p:par>
+    </p:tnLst>
+  </p:timing>
 </p:sld>
 </file>
 
@@ -17419,8 +17407,12 @@
           </a:p>
           <a:p>
             <a:r>
+              <a:rPr lang="en-US" dirty="0" smtClean="0"/>
+              <a:t>file </a:t>
+            </a:r>
+            <a:r>
               <a:rPr lang="en-US" dirty="0"/>
-              <a:t>file '/</a:t>
+              <a:t>'/</a:t>
             </a:r>
             <a:r>
               <a:rPr lang="en-US" dirty="0" err="1"/>
@@ -17628,7 +17620,7 @@
               <a:t>This is why we </a:t>
             </a:r>
             <a:r>
-              <a:rPr lang="en-US" u="sng" dirty="0" smtClean="0"/>
+              <a:rPr lang="en-US" b="1" dirty="0" smtClean="0"/>
               <a:t>can</a:t>
             </a:r>
             <a:r>
@@ -18337,7 +18329,7 @@
               <a:t>This is why we </a:t>
             </a:r>
             <a:r>
-              <a:rPr lang="en-US" u="sng" dirty="0" smtClean="0"/>
+              <a:rPr lang="en-US" b="1" dirty="0" smtClean="0"/>
               <a:t>can</a:t>
             </a:r>
             <a:r>
@@ -18603,7 +18595,12 @@
             <p:ph type="subTitle" idx="1"/>
           </p:nvPr>
         </p:nvSpPr>
-        <p:spPr/>
+        <p:spPr>
+          <a:xfrm>
+            <a:off x="1671638" y="3260725"/>
+            <a:ext cx="12319000" cy="4150099"/>
+          </a:xfrm>
+        </p:spPr>
         <p:txBody>
           <a:bodyPr/>
           <a:lstStyle/>
@@ -18679,8 +18676,27 @@
                 <a:ea typeface="Courier New" charset="0"/>
                 <a:cs typeface="Courier New" charset="0"/>
               </a:rPr>
-              <a:t>' contains the content '&lt;h1&gt;Welcome Home!&lt;/h1&gt;'.</a:t>
-            </a:r>
+              <a:t>' contains the content '&lt;h1&gt;Welcome Home!&lt;/h1&gt;</a:t>
+            </a:r>
+            <a:r>
+              <a:rPr lang="en-US" b="1" dirty="0" smtClean="0">
+                <a:solidFill>
+                  <a:schemeClr val="tx1"/>
+                </a:solidFill>
+                <a:latin typeface="Courier New" charset="0"/>
+                <a:ea typeface="Courier New" charset="0"/>
+                <a:cs typeface="Courier New" charset="0"/>
+              </a:rPr>
+              <a:t>'</a:t>
+            </a:r>
+            <a:endParaRPr lang="en-US" b="1" dirty="0" smtClean="0">
+              <a:solidFill>
+                <a:schemeClr val="tx1"/>
+              </a:solidFill>
+              <a:latin typeface="Courier New" charset="0"/>
+              <a:ea typeface="Courier New" charset="0"/>
+              <a:cs typeface="Courier New" charset="0"/>
+            </a:endParaRPr>
           </a:p>
           <a:p>
             <a:endParaRPr lang="en-US" dirty="0" smtClean="0"/>
@@ -18688,25 +18704,47 @@
           <a:p>
             <a:r>
               <a:rPr lang="en-US" dirty="0" smtClean="0"/>
-              <a:t>Remove </a:t>
+              <a:t>Delete the automatically generated </a:t>
+            </a:r>
+            <a:r>
+              <a:rPr lang="en-US" dirty="0" err="1" smtClean="0"/>
+              <a:t>InSpec</a:t>
+            </a:r>
+            <a:r>
+              <a:rPr lang="en-US" dirty="0" smtClean="0"/>
+              <a:t> test</a:t>
+            </a:r>
+          </a:p>
+          <a:p>
+            <a:r>
+              <a:rPr lang="en-US" dirty="0" smtClean="0"/>
+              <a:t>Within </a:t>
             </a:r>
             <a:r>
               <a:rPr lang="en-US" dirty="0"/>
-              <a:t>the </a:t>
-            </a:r>
-            <a:r>
-              <a:rPr lang="en-US" dirty="0" smtClean="0"/>
-              <a:t>file resource </a:t>
+              <a:t>the default </a:t>
+            </a:r>
+            <a:r>
+              <a:rPr lang="en-US" dirty="0" smtClean="0"/>
+              <a:t>recipe </a:t>
             </a:r>
             <a:r>
               <a:rPr lang="en-US" dirty="0"/>
-              <a:t>from the default recipe</a:t>
-            </a:r>
-          </a:p>
-          <a:p>
+              <a:t>r</a:t>
+            </a:r>
+            <a:r>
+              <a:rPr lang="en-US" dirty="0" smtClean="0"/>
+              <a:t>eplace the file resource with an include recipe</a:t>
+            </a:r>
+          </a:p>
+          <a:p>
+            <a:r>
+              <a:rPr lang="en-US" dirty="0" smtClean="0"/>
+              <a:t>Converge </a:t>
+            </a:r>
             <a:r>
               <a:rPr lang="en-US" dirty="0"/>
-              <a:t>Converge and </a:t>
+              <a:t>and </a:t>
             </a:r>
             <a:r>
               <a:rPr lang="en-US" dirty="0" smtClean="0"/>
@@ -19241,6 +19279,13 @@
   <p:transition xmlns:p14="http://schemas.microsoft.com/office/powerpoint/2010/main" spd="med">
     <p:fade/>
   </p:transition>
+  <p:timing>
+    <p:tnLst>
+      <p:par>
+        <p:cTn xmlns:p14="http://schemas.microsoft.com/office/powerpoint/2010/main" id="1" dur="indefinite" restart="never" nodeType="tmRoot"/>
+      </p:par>
+    </p:tnLst>
+  </p:timing>
 </p:sld>
 </file>
 
@@ -20524,8 +20569,27 @@
                 <a:ea typeface="Courier New" charset="0"/>
                 <a:cs typeface="Courier New" charset="0"/>
               </a:rPr>
-              <a:t>' contains the content '&lt;h1&gt;Welcome Home!&lt;/h1&gt;'.</a:t>
-            </a:r>
+              <a:t>' contains the content '&lt;h1&gt;Welcome Home!&lt;/h1&gt;</a:t>
+            </a:r>
+            <a:r>
+              <a:rPr lang="en-US" b="1" dirty="0" smtClean="0">
+                <a:solidFill>
+                  <a:schemeClr val="tx1"/>
+                </a:solidFill>
+                <a:latin typeface="Courier New" charset="0"/>
+                <a:ea typeface="Courier New" charset="0"/>
+                <a:cs typeface="Courier New" charset="0"/>
+              </a:rPr>
+              <a:t>'</a:t>
+            </a:r>
+            <a:endParaRPr lang="en-US" b="1" dirty="0" smtClean="0">
+              <a:solidFill>
+                <a:schemeClr val="tx1"/>
+              </a:solidFill>
+              <a:latin typeface="Courier New" charset="0"/>
+              <a:ea typeface="Courier New" charset="0"/>
+              <a:cs typeface="Courier New" charset="0"/>
+            </a:endParaRPr>
           </a:p>
           <a:p>
             <a:endParaRPr lang="en-US" dirty="0" smtClean="0"/>
@@ -20536,20 +20600,16 @@
               <a:buChar char="ü"/>
             </a:pPr>
             <a:r>
-              <a:rPr lang="en-US" dirty="0" smtClean="0"/>
-              <a:t>Remove </a:t>
-            </a:r>
-            <a:r>
               <a:rPr lang="en-US" dirty="0"/>
-              <a:t>the </a:t>
-            </a:r>
-            <a:r>
-              <a:rPr lang="en-US" dirty="0" smtClean="0"/>
-              <a:t>file resource </a:t>
+              <a:t>Delete the automatically generated </a:t>
+            </a:r>
+            <a:r>
+              <a:rPr lang="en-US" dirty="0" err="1"/>
+              <a:t>InSpec</a:t>
             </a:r>
             <a:r>
               <a:rPr lang="en-US" dirty="0"/>
-              <a:t>from the default recipe</a:t>
+              <a:t> test</a:t>
             </a:r>
           </a:p>
           <a:p>
@@ -20559,7 +20619,21 @@
             </a:pPr>
             <a:r>
               <a:rPr lang="en-US" dirty="0"/>
-              <a:t>Converge and </a:t>
+              <a:t>Within the default recipe replace the file resource with an include recipe</a:t>
+            </a:r>
+          </a:p>
+          <a:p>
+            <a:pPr>
+              <a:buFont typeface="Wingdings" charset="2"/>
+              <a:buChar char="ü"/>
+            </a:pPr>
+            <a:r>
+              <a:rPr lang="en-US" dirty="0" smtClean="0"/>
+              <a:t>Converge </a:t>
+            </a:r>
+            <a:r>
+              <a:rPr lang="en-US" dirty="0"/>
+              <a:t>and </a:t>
             </a:r>
             <a:r>
               <a:rPr lang="en-US" dirty="0" smtClean="0"/>
@@ -20725,7 +20799,18 @@
                 <a:ea typeface="Courier New" charset="0"/>
                 <a:cs typeface="Courier New" charset="0"/>
               </a:rPr>
-              <a:t>' is started and enabled.</a:t>
+              <a:t>' is started and </a:t>
+            </a:r>
+            <a:r>
+              <a:rPr lang="en-US" b="1" dirty="0" smtClean="0">
+                <a:solidFill>
+                  <a:schemeClr val="tx1"/>
+                </a:solidFill>
+                <a:latin typeface="Courier New" charset="0"/>
+                <a:ea typeface="Courier New" charset="0"/>
+                <a:cs typeface="Courier New" charset="0"/>
+              </a:rPr>
+              <a:t>enabled</a:t>
             </a:r>
             <a:endParaRPr lang="en-US" b="1" dirty="0">
               <a:solidFill>
@@ -20742,7 +20827,21 @@
           <a:p>
             <a:r>
               <a:rPr lang="en-US" dirty="0"/>
-              <a:t>Remove the </a:t>
+              <a:t>Delete the automatically generated </a:t>
+            </a:r>
+            <a:r>
+              <a:rPr lang="en-US" dirty="0" err="1"/>
+              <a:t>InSpec</a:t>
+            </a:r>
+            <a:r>
+              <a:rPr lang="en-US" dirty="0"/>
+              <a:t> test</a:t>
+            </a:r>
+          </a:p>
+          <a:p>
+            <a:r>
+              <a:rPr lang="en-US" dirty="0"/>
+              <a:t>Within the default recipe replace the </a:t>
             </a:r>
             <a:r>
               <a:rPr lang="en-US" dirty="0" smtClean="0"/>
@@ -20750,13 +20849,17 @@
             </a:r>
             <a:r>
               <a:rPr lang="en-US" dirty="0"/>
-              <a:t>from the default recipe</a:t>
-            </a:r>
-          </a:p>
-          <a:p>
+              <a:t>with an include recipe</a:t>
+            </a:r>
+          </a:p>
+          <a:p>
+            <a:r>
+              <a:rPr lang="en-US" dirty="0" smtClean="0"/>
+              <a:t>Converge </a:t>
+            </a:r>
             <a:r>
               <a:rPr lang="en-US" dirty="0"/>
-              <a:t>Converge and verify the test instance to ensure there are no failures</a:t>
+              <a:t>and verify the test instance to ensure there are no failures</a:t>
             </a:r>
           </a:p>
         </p:txBody>
@@ -20783,7 +20886,7 @@
         </p:blipFill>
         <p:spPr>
           <a:xfrm rot="1182617" flipH="1">
-            <a:off x="12261414" y="6738463"/>
+            <a:off x="12261414" y="6843051"/>
             <a:ext cx="4873752" cy="3436542"/>
           </a:xfrm>
           <a:prstGeom prst="rect">
@@ -20849,7 +20952,7 @@
         </p:nvSpPr>
         <p:spPr bwMode="auto">
           <a:xfrm>
-            <a:off x="9418320" y="6728496"/>
+            <a:off x="9388438" y="7116967"/>
             <a:ext cx="3208274" cy="613933"/>
           </a:xfrm>
           <a:prstGeom prst="rect">
@@ -21286,6 +21389,13 @@
   <p:transition xmlns:p14="http://schemas.microsoft.com/office/powerpoint/2010/main" spd="med">
     <p:fade/>
   </p:transition>
+  <p:timing>
+    <p:tnLst>
+      <p:par>
+        <p:cTn xmlns:p14="http://schemas.microsoft.com/office/powerpoint/2010/main" id="1" dur="indefinite" restart="never" nodeType="tmRoot"/>
+      </p:par>
+    </p:tnLst>
+  </p:timing>
 </p:sld>
 </file>
 
@@ -22490,7 +22600,6 @@
               <a:rPr lang="en-US" dirty="0"/>
               <a:t>Summary: 2 successful, 0 failures, 0 skipped</a:t>
             </a:r>
-            <a:endParaRPr lang="en-US" dirty="0"/>
           </a:p>
         </p:txBody>
       </p:sp>
@@ -22713,15 +22822,15 @@
             </a:pPr>
             <a:r>
               <a:rPr lang="en-US" dirty="0"/>
-              <a:t>Remove the </a:t>
-            </a:r>
-            <a:r>
-              <a:rPr lang="en-US" dirty="0" smtClean="0"/>
-              <a:t>service resource </a:t>
+              <a:t>Delete the automatically generated </a:t>
+            </a:r>
+            <a:r>
+              <a:rPr lang="en-US" dirty="0" err="1"/>
+              <a:t>InSpec</a:t>
             </a:r>
             <a:r>
               <a:rPr lang="en-US" dirty="0"/>
-              <a:t>from the default recipe</a:t>
+              <a:t> test</a:t>
             </a:r>
           </a:p>
           <a:p>
@@ -22731,7 +22840,21 @@
             </a:pPr>
             <a:r>
               <a:rPr lang="en-US" dirty="0"/>
-              <a:t>Converge and verify the test instance to ensure there are no failures</a:t>
+              <a:t>Within the default recipe replace the service resource with an include recipe</a:t>
+            </a:r>
+          </a:p>
+          <a:p>
+            <a:pPr>
+              <a:buFont typeface="Wingdings" charset="2"/>
+              <a:buChar char="ü"/>
+            </a:pPr>
+            <a:r>
+              <a:rPr lang="en-US" dirty="0" smtClean="0"/>
+              <a:t>Converge </a:t>
+            </a:r>
+            <a:r>
+              <a:rPr lang="en-US" dirty="0"/>
+              <a:t>and verify the test instance to ensure there are no failures</a:t>
             </a:r>
           </a:p>
         </p:txBody>
@@ -22774,7 +22897,7 @@
         </p:nvSpPr>
         <p:spPr>
           <a:xfrm rot="12130957">
-            <a:off x="12363590" y="7319410"/>
+            <a:off x="12363590" y="7334351"/>
             <a:ext cx="975947" cy="306967"/>
           </a:xfrm>
           <a:prstGeom prst="arc">
@@ -22818,13 +22941,13 @@
       </p:sp>
       <p:sp>
         <p:nvSpPr>
-          <p:cNvPr id="6" name="Rectangle 5"/>
+          <p:cNvPr id="7" name="Rectangle 6"/>
           <p:cNvSpPr/>
           <p:nvPr/>
         </p:nvSpPr>
         <p:spPr bwMode="auto">
           <a:xfrm>
-            <a:off x="9418320" y="6728496"/>
+            <a:off x="9388438" y="7116967"/>
             <a:ext cx="3208274" cy="613933"/>
           </a:xfrm>
           <a:prstGeom prst="rect">
@@ -22870,12 +22993,12 @@
           <a:p>
             <a:pPr algn="ctr" defTabSz="914099"/>
             <a:r>
-              <a:rPr lang="en-US" sz="1800" smtClean="0">
+              <a:rPr lang="en-US" sz="1800" dirty="0" smtClean="0">
                 <a:solidFill>
                   <a:schemeClr val="tx2"/>
                 </a:solidFill>
               </a:rPr>
-              <a:t>My hair will grow back.</a:t>
+              <a:t>My hair will grow back!</a:t>
             </a:r>
             <a:endParaRPr lang="en-US" sz="1800" dirty="0" smtClean="0">
               <a:solidFill>
@@ -24914,15 +25037,7 @@
             </a:r>
             <a:r>
               <a:rPr lang="en-US" dirty="0" smtClean="0"/>
-              <a:t>      Converging </a:t>
-            </a:r>
-            <a:r>
-              <a:rPr lang="en-US" dirty="0" smtClean="0"/>
-              <a:t>3 </a:t>
-            </a:r>
-            <a:r>
-              <a:rPr lang="en-US" dirty="0" smtClean="0"/>
-              <a:t>resources</a:t>
+              <a:t>      Converging 3 resources</a:t>
             </a:r>
           </a:p>
           <a:p>
@@ -25227,7 +25342,6 @@
               <a:rPr lang="en-US" dirty="0"/>
               <a:t>Summary: 2 successful, 0 failures, 0 skipped</a:t>
             </a:r>
-            <a:endParaRPr lang="en-US" dirty="0"/>
           </a:p>
         </p:txBody>
       </p:sp>
@@ -28198,15 +28312,7 @@
           <a:p>
             <a:r>
               <a:rPr lang="en-US" dirty="0" smtClean="0"/>
-              <a:t>     </a:t>
-            </a:r>
-            <a:r>
-              <a:rPr lang="en-US" dirty="0" smtClean="0"/>
-              <a:t>  .</a:t>
-            </a:r>
-            <a:r>
-              <a:rPr lang="en-US" dirty="0" smtClean="0"/>
-              <a:t>.</a:t>
+              <a:t>       ..</a:t>
             </a:r>
             <a:r>
               <a:rPr lang="en-US" dirty="0"/>
@@ -30315,7 +30421,7 @@
               <a:t>This is why we </a:t>
             </a:r>
             <a:r>
-              <a:rPr lang="en-US" u="sng" dirty="0" smtClean="0"/>
+              <a:rPr lang="en-US" b="1" dirty="0" smtClean="0"/>
               <a:t>can</a:t>
             </a:r>
             <a:r>

</xml_diff>